<commit_message>
Bug fixing: 1/1 recomendaciones cuando era un proveedor sin ningún trabajo realizado PPT Presentación final Web.config: Redirección en caso de errores
</commit_message>
<xml_diff>
--- a/Documentación/Presentaciones PPT/Tesis 2 - Mendez Presentación FINAL.pptx
+++ b/Documentación/Presentaciones PPT/Tesis 2 - Mendez Presentación FINAL.pptx
@@ -4570,7 +4570,15 @@
           </a:br>
           <a:r>
             <a:rPr lang="es-MX" sz="1600" dirty="0" smtClean="0"/>
-            <a:t>   c. Distanciamiento entre proveedores y cliente.</a:t>
+            <a:t>   c. Distanciamiento </a:t>
+          </a:r>
+          <a:r>
+            <a:rPr lang="es-MX" sz="1600" dirty="0" smtClean="0"/>
+            <a:t>físico entre </a:t>
+          </a:r>
+          <a:r>
+            <a:rPr lang="es-MX" sz="1600" dirty="0" smtClean="0"/>
+            <a:t>proveedores y cliente.</a:t>
           </a:r>
           <a:br>
             <a:rPr lang="es-MX" sz="1600" dirty="0" smtClean="0"/>
@@ -4852,22 +4860,22 @@
     </dgm:pt>
   </dgm:ptLst>
   <dgm:cxnLst>
+    <dgm:cxn modelId="{5BEF8FBD-F7BC-444D-94D8-BB8E5A82AA43}" srcId="{9BF01063-3BAB-4F4D-ADE8-387A89D22F7C}" destId="{924689B8-E4E2-4802-BC6B-5B17E3AC8DDF}" srcOrd="2" destOrd="0" parTransId="{670CB166-EC54-4ECF-99EE-166A3C70F39E}" sibTransId="{A9E69FD6-91A0-40D3-96F5-93981AACB6C2}"/>
+    <dgm:cxn modelId="{4219486A-1AA6-4D7C-8DCD-F38DE310E10B}" type="presOf" srcId="{924689B8-E4E2-4802-BC6B-5B17E3AC8DDF}" destId="{E2ADE456-C079-4778-88D3-2ABF030BE345}" srcOrd="0" destOrd="0" presId="urn:microsoft.com/office/officeart/2005/8/layout/list1"/>
+    <dgm:cxn modelId="{A1CD1BE4-A834-4463-86D1-583A19E39584}" type="presOf" srcId="{9BF01063-3BAB-4F4D-ADE8-387A89D22F7C}" destId="{159D9149-F9AA-45E8-ABA6-7AC56A21C1F8}" srcOrd="0" destOrd="0" presId="urn:microsoft.com/office/officeart/2005/8/layout/list1"/>
+    <dgm:cxn modelId="{5D020E2A-D409-452B-ABB3-0EFE3A92652C}" type="presOf" srcId="{4C11F0D3-B1D8-41E5-B4ED-D28D5406ED7A}" destId="{C94856A0-C8B1-4244-B645-C266926A0AAB}" srcOrd="0" destOrd="0" presId="urn:microsoft.com/office/officeart/2005/8/layout/list1"/>
+    <dgm:cxn modelId="{FB20BC1E-834C-48C0-BD4E-04A5E0873844}" srcId="{4D5D3E7B-9F50-4387-AFBC-12316FB9B2E8}" destId="{4C11F0D3-B1D8-41E5-B4ED-D28D5406ED7A}" srcOrd="0" destOrd="0" parTransId="{C60CEBD2-531F-45D5-9CB2-1FBB715F4879}" sibTransId="{A1BF3405-CB09-4D5F-AAD9-E76A127FDC0C}"/>
+    <dgm:cxn modelId="{9738BE00-F026-4DB2-B7F4-EA1061D3A7FF}" type="presOf" srcId="{3BFDB7AE-EA70-4208-99E4-6652F73E09AF}" destId="{0F91977E-FD5F-4F09-AD28-B3380115D8C3}" srcOrd="0" destOrd="0" presId="urn:microsoft.com/office/officeart/2005/8/layout/list1"/>
+    <dgm:cxn modelId="{3B487C66-25D7-4E41-A5C2-F42C47637A7A}" type="presOf" srcId="{924689B8-E4E2-4802-BC6B-5B17E3AC8DDF}" destId="{E74DBF66-3AE1-4F14-A029-A5F2D0C36F78}" srcOrd="1" destOrd="0" presId="urn:microsoft.com/office/officeart/2005/8/layout/list1"/>
+    <dgm:cxn modelId="{26882D24-1258-440C-9950-32BA7E116E89}" type="presOf" srcId="{A43E1EE4-EA84-469B-B8E9-F87184BCD406}" destId="{FC04ED5C-48CE-49A3-98DF-4CA3B004B014}" srcOrd="0" destOrd="0" presId="urn:microsoft.com/office/officeart/2005/8/layout/list1"/>
+    <dgm:cxn modelId="{418BDB1E-B14B-41A7-9D8C-9C6887C8BC7F}" type="presOf" srcId="{4D5D3E7B-9F50-4387-AFBC-12316FB9B2E8}" destId="{15417C44-1630-41CC-AC5B-95723803EAAC}" srcOrd="1" destOrd="0" presId="urn:microsoft.com/office/officeart/2005/8/layout/list1"/>
     <dgm:cxn modelId="{78C0F103-0BC0-46BC-BBBC-D58341736E99}" type="presOf" srcId="{5D56325C-A28C-4982-810F-F3CCECEC2E7D}" destId="{3C682040-43AF-4BE8-950E-E13003E6C6C7}" srcOrd="0" destOrd="0" presId="urn:microsoft.com/office/officeart/2005/8/layout/list1"/>
+    <dgm:cxn modelId="{E344A32A-539A-4B7E-ACFA-95DEF5620BA5}" srcId="{9BF01063-3BAB-4F4D-ADE8-387A89D22F7C}" destId="{3BFDB7AE-EA70-4208-99E4-6652F73E09AF}" srcOrd="1" destOrd="0" parTransId="{54A7580C-2761-4683-A631-30A94395D65A}" sibTransId="{9EFD2A57-70D2-4814-9534-F69C1AAF4BEC}"/>
+    <dgm:cxn modelId="{108E09CC-8703-4C9A-9F4C-239B367EEF86}" type="presOf" srcId="{3BFDB7AE-EA70-4208-99E4-6652F73E09AF}" destId="{501DDC76-9B9F-4697-8027-10EB121BC8A9}" srcOrd="1" destOrd="0" presId="urn:microsoft.com/office/officeart/2005/8/layout/list1"/>
+    <dgm:cxn modelId="{DED07964-2F3D-434B-8896-63F590AFB3D4}" srcId="{9BF01063-3BAB-4F4D-ADE8-387A89D22F7C}" destId="{4D5D3E7B-9F50-4387-AFBC-12316FB9B2E8}" srcOrd="0" destOrd="0" parTransId="{4B140464-D0A6-4FE6-BFF1-D92A0DD7F2F3}" sibTransId="{86595B4C-0A5C-4BD5-A6B3-FDB543D91B73}"/>
     <dgm:cxn modelId="{2206174B-0967-4701-B7BB-572D079B3A22}" srcId="{3BFDB7AE-EA70-4208-99E4-6652F73E09AF}" destId="{5D56325C-A28C-4982-810F-F3CCECEC2E7D}" srcOrd="0" destOrd="0" parTransId="{5D99972C-BEA3-4759-BAAC-F0514ABC1FE1}" sibTransId="{ECCC7701-505F-42F0-B3C4-E9890A7BB77B}"/>
+    <dgm:cxn modelId="{D348ABC0-E7C5-475A-B6F1-B134560759E1}" type="presOf" srcId="{4D5D3E7B-9F50-4387-AFBC-12316FB9B2E8}" destId="{F126904A-86E7-4DEB-A715-98702053D074}" srcOrd="0" destOrd="0" presId="urn:microsoft.com/office/officeart/2005/8/layout/list1"/>
     <dgm:cxn modelId="{C611089B-F9C4-4CB8-A2DC-4A6E2B8ECF02}" srcId="{924689B8-E4E2-4802-BC6B-5B17E3AC8DDF}" destId="{A43E1EE4-EA84-469B-B8E9-F87184BCD406}" srcOrd="0" destOrd="0" parTransId="{B5EEE765-35D4-4DF0-BFEC-78B63BE24D65}" sibTransId="{DFDEAEA3-03A5-44E8-ACA1-35C31669F285}"/>
-    <dgm:cxn modelId="{FB20BC1E-834C-48C0-BD4E-04A5E0873844}" srcId="{4D5D3E7B-9F50-4387-AFBC-12316FB9B2E8}" destId="{4C11F0D3-B1D8-41E5-B4ED-D28D5406ED7A}" srcOrd="0" destOrd="0" parTransId="{C60CEBD2-531F-45D5-9CB2-1FBB715F4879}" sibTransId="{A1BF3405-CB09-4D5F-AAD9-E76A127FDC0C}"/>
-    <dgm:cxn modelId="{4219486A-1AA6-4D7C-8DCD-F38DE310E10B}" type="presOf" srcId="{924689B8-E4E2-4802-BC6B-5B17E3AC8DDF}" destId="{E2ADE456-C079-4778-88D3-2ABF030BE345}" srcOrd="0" destOrd="0" presId="urn:microsoft.com/office/officeart/2005/8/layout/list1"/>
-    <dgm:cxn modelId="{26882D24-1258-440C-9950-32BA7E116E89}" type="presOf" srcId="{A43E1EE4-EA84-469B-B8E9-F87184BCD406}" destId="{FC04ED5C-48CE-49A3-98DF-4CA3B004B014}" srcOrd="0" destOrd="0" presId="urn:microsoft.com/office/officeart/2005/8/layout/list1"/>
-    <dgm:cxn modelId="{108E09CC-8703-4C9A-9F4C-239B367EEF86}" type="presOf" srcId="{3BFDB7AE-EA70-4208-99E4-6652F73E09AF}" destId="{501DDC76-9B9F-4697-8027-10EB121BC8A9}" srcOrd="1" destOrd="0" presId="urn:microsoft.com/office/officeart/2005/8/layout/list1"/>
-    <dgm:cxn modelId="{5D020E2A-D409-452B-ABB3-0EFE3A92652C}" type="presOf" srcId="{4C11F0D3-B1D8-41E5-B4ED-D28D5406ED7A}" destId="{C94856A0-C8B1-4244-B645-C266926A0AAB}" srcOrd="0" destOrd="0" presId="urn:microsoft.com/office/officeart/2005/8/layout/list1"/>
-    <dgm:cxn modelId="{9738BE00-F026-4DB2-B7F4-EA1061D3A7FF}" type="presOf" srcId="{3BFDB7AE-EA70-4208-99E4-6652F73E09AF}" destId="{0F91977E-FD5F-4F09-AD28-B3380115D8C3}" srcOrd="0" destOrd="0" presId="urn:microsoft.com/office/officeart/2005/8/layout/list1"/>
-    <dgm:cxn modelId="{D348ABC0-E7C5-475A-B6F1-B134560759E1}" type="presOf" srcId="{4D5D3E7B-9F50-4387-AFBC-12316FB9B2E8}" destId="{F126904A-86E7-4DEB-A715-98702053D074}" srcOrd="0" destOrd="0" presId="urn:microsoft.com/office/officeart/2005/8/layout/list1"/>
-    <dgm:cxn modelId="{3B487C66-25D7-4E41-A5C2-F42C47637A7A}" type="presOf" srcId="{924689B8-E4E2-4802-BC6B-5B17E3AC8DDF}" destId="{E74DBF66-3AE1-4F14-A029-A5F2D0C36F78}" srcOrd="1" destOrd="0" presId="urn:microsoft.com/office/officeart/2005/8/layout/list1"/>
-    <dgm:cxn modelId="{A1CD1BE4-A834-4463-86D1-583A19E39584}" type="presOf" srcId="{9BF01063-3BAB-4F4D-ADE8-387A89D22F7C}" destId="{159D9149-F9AA-45E8-ABA6-7AC56A21C1F8}" srcOrd="0" destOrd="0" presId="urn:microsoft.com/office/officeart/2005/8/layout/list1"/>
-    <dgm:cxn modelId="{DED07964-2F3D-434B-8896-63F590AFB3D4}" srcId="{9BF01063-3BAB-4F4D-ADE8-387A89D22F7C}" destId="{4D5D3E7B-9F50-4387-AFBC-12316FB9B2E8}" srcOrd="0" destOrd="0" parTransId="{4B140464-D0A6-4FE6-BFF1-D92A0DD7F2F3}" sibTransId="{86595B4C-0A5C-4BD5-A6B3-FDB543D91B73}"/>
-    <dgm:cxn modelId="{E344A32A-539A-4B7E-ACFA-95DEF5620BA5}" srcId="{9BF01063-3BAB-4F4D-ADE8-387A89D22F7C}" destId="{3BFDB7AE-EA70-4208-99E4-6652F73E09AF}" srcOrd="1" destOrd="0" parTransId="{54A7580C-2761-4683-A631-30A94395D65A}" sibTransId="{9EFD2A57-70D2-4814-9534-F69C1AAF4BEC}"/>
-    <dgm:cxn modelId="{418BDB1E-B14B-41A7-9D8C-9C6887C8BC7F}" type="presOf" srcId="{4D5D3E7B-9F50-4387-AFBC-12316FB9B2E8}" destId="{15417C44-1630-41CC-AC5B-95723803EAAC}" srcOrd="1" destOrd="0" presId="urn:microsoft.com/office/officeart/2005/8/layout/list1"/>
-    <dgm:cxn modelId="{5BEF8FBD-F7BC-444D-94D8-BB8E5A82AA43}" srcId="{9BF01063-3BAB-4F4D-ADE8-387A89D22F7C}" destId="{924689B8-E4E2-4802-BC6B-5B17E3AC8DDF}" srcOrd="2" destOrd="0" parTransId="{670CB166-EC54-4ECF-99EE-166A3C70F39E}" sibTransId="{A9E69FD6-91A0-40D3-96F5-93981AACB6C2}"/>
     <dgm:cxn modelId="{BE00BBB3-1184-461B-97F7-D315BDD3D691}" type="presParOf" srcId="{159D9149-F9AA-45E8-ABA6-7AC56A21C1F8}" destId="{1063D51E-A931-450E-B6C9-26E16E6105C8}" srcOrd="0" destOrd="0" presId="urn:microsoft.com/office/officeart/2005/8/layout/list1"/>
     <dgm:cxn modelId="{79CF50A7-E302-42DE-B4FA-14593CA58892}" type="presParOf" srcId="{1063D51E-A931-450E-B6C9-26E16E6105C8}" destId="{F126904A-86E7-4DEB-A715-98702053D074}" srcOrd="0" destOrd="0" presId="urn:microsoft.com/office/officeart/2005/8/layout/list1"/>
     <dgm:cxn modelId="{3ABCB8CF-0045-4A73-BD75-619AA227F38A}" type="presParOf" srcId="{1063D51E-A931-450E-B6C9-26E16E6105C8}" destId="{15417C44-1630-41CC-AC5B-95723803EAAC}" srcOrd="1" destOrd="0" presId="urn:microsoft.com/office/officeart/2005/8/layout/list1"/>
@@ -6695,7 +6703,15 @@
           </a:br>
           <a:r>
             <a:rPr lang="es-MX" sz="1600" kern="1200" dirty="0" smtClean="0"/>
-            <a:t>   c. Distanciamiento entre proveedores y cliente.</a:t>
+            <a:t>   c. Distanciamiento </a:t>
+          </a:r>
+          <a:r>
+            <a:rPr lang="es-MX" sz="1600" kern="1200" dirty="0" smtClean="0"/>
+            <a:t>físico entre </a:t>
+          </a:r>
+          <a:r>
+            <a:rPr lang="es-MX" sz="1600" kern="1200" dirty="0" smtClean="0"/>
+            <a:t>proveedores y cliente.</a:t>
           </a:r>
           <a:br>
             <a:rPr lang="es-MX" sz="1600" kern="1200" dirty="0" smtClean="0"/>
@@ -15828,7 +15844,7 @@
               <a:pPr>
                 <a:defRPr/>
               </a:pPr>
-              <a:t>23/11/2013</a:t>
+              <a:t>27/11/2013</a:t>
             </a:fld>
             <a:endParaRPr lang="es-PE"/>
           </a:p>
@@ -16026,7 +16042,7 @@
               <a:pPr>
                 <a:defRPr/>
               </a:pPr>
-              <a:t>23/11/2013</a:t>
+              <a:t>27/11/2013</a:t>
             </a:fld>
             <a:endParaRPr lang="es-PE"/>
           </a:p>
@@ -16233,7 +16249,7 @@
               <a:pPr>
                 <a:defRPr/>
               </a:pPr>
-              <a:t>23/11/2013</a:t>
+              <a:t>27/11/2013</a:t>
             </a:fld>
             <a:endParaRPr lang="es-PE"/>
           </a:p>
@@ -17678,7 +17694,7 @@
               <a:pPr>
                 <a:defRPr/>
               </a:pPr>
-              <a:t>23/11/2013</a:t>
+              <a:t>27/11/2013</a:t>
             </a:fld>
             <a:endParaRPr lang="es-PE"/>
           </a:p>
@@ -19913,7 +19929,7 @@
               <a:pPr>
                 <a:defRPr/>
               </a:pPr>
-              <a:t>23/11/2013</a:t>
+              <a:t>27/11/2013</a:t>
             </a:fld>
             <a:endParaRPr lang="es-PE"/>
           </a:p>
@@ -21111,7 +21127,7 @@
               <a:pPr>
                 <a:defRPr/>
               </a:pPr>
-              <a:t>23/11/2013</a:t>
+              <a:t>27/11/2013</a:t>
             </a:fld>
             <a:endParaRPr lang="es-PE"/>
           </a:p>
@@ -21560,7 +21576,7 @@
               <a:pPr>
                 <a:defRPr/>
               </a:pPr>
-              <a:t>23/11/2013</a:t>
+              <a:t>27/11/2013</a:t>
             </a:fld>
             <a:endParaRPr lang="es-PE"/>
           </a:p>
@@ -21705,7 +21721,7 @@
               <a:pPr>
                 <a:defRPr/>
               </a:pPr>
-              <a:t>23/11/2013</a:t>
+              <a:t>27/11/2013</a:t>
             </a:fld>
             <a:endParaRPr lang="es-PE"/>
           </a:p>
@@ -21827,7 +21843,7 @@
               <a:pPr>
                 <a:defRPr/>
               </a:pPr>
-              <a:t>23/11/2013</a:t>
+              <a:t>27/11/2013</a:t>
             </a:fld>
             <a:endParaRPr lang="es-PE"/>
           </a:p>
@@ -22131,7 +22147,7 @@
               <a:pPr>
                 <a:defRPr/>
               </a:pPr>
-              <a:t>23/11/2013</a:t>
+              <a:t>27/11/2013</a:t>
             </a:fld>
             <a:endParaRPr lang="es-PE"/>
           </a:p>
@@ -22414,7 +22430,7 @@
               <a:pPr>
                 <a:defRPr/>
               </a:pPr>
-              <a:t>23/11/2013</a:t>
+              <a:t>27/11/2013</a:t>
             </a:fld>
             <a:endParaRPr lang="es-PE"/>
           </a:p>
@@ -22701,7 +22717,7 @@
               <a:pPr>
                 <a:defRPr/>
               </a:pPr>
-              <a:t>23/11/2013</a:t>
+              <a:t>27/11/2013</a:t>
             </a:fld>
             <a:endParaRPr lang="es-PE"/>
           </a:p>
@@ -27669,15 +27685,7 @@
             </a:pPr>
             <a:r>
               <a:rPr lang="es-PE" sz="1600" dirty="0" smtClean="0"/>
-              <a:t>Centralizar la información de tiendas y cadenas </a:t>
-            </a:r>
-            <a:r>
-              <a:rPr lang="es-PE" sz="1600" dirty="0" smtClean="0"/>
-              <a:t>de ferreterías</a:t>
-            </a:r>
-            <a:r>
-              <a:rPr lang="es-PE" sz="1600" dirty="0" smtClean="0"/>
-              <a:t>.</a:t>
+              <a:t>Centralizar la información de tiendas y cadenas de ferreterías.</a:t>
             </a:r>
           </a:p>
           <a:p>
@@ -27697,11 +27705,7 @@
             </a:pPr>
             <a:r>
               <a:rPr lang="es-MX" sz="1600" dirty="0" smtClean="0"/>
-              <a:t>Reportes y consolidados estadísticos sobre </a:t>
-            </a:r>
-            <a:r>
-              <a:rPr lang="es-MX" sz="1600" dirty="0" smtClean="0"/>
-              <a:t>la situación de los servicios generales.</a:t>
+              <a:t>Reportes y consolidados estadísticos sobre la situación de los servicios generales.</a:t>
             </a:r>
             <a:endParaRPr lang="es-MX" sz="1600" dirty="0"/>
           </a:p>
@@ -30340,7 +30344,7 @@
           <p:nvPr>
             <p:extLst>
               <p:ext uri="{D42A27DB-BD31-4B8C-83A1-F6EECF244321}">
-                <p14:modId xmlns:p14="http://schemas.microsoft.com/office/powerpoint/2010/main" val="3124728933"/>
+                <p14:modId xmlns:p14="http://schemas.microsoft.com/office/powerpoint/2010/main" val="3216292919"/>
               </p:ext>
             </p:extLst>
           </p:nvPr>

</xml_diff>